<commit_message>
new rounded icon + brand new stackoverflow save button
</commit_message>
<xml_diff>
--- a/misc/icon-design/icon-design.pptx
+++ b/misc/icon-design/icon-design.pptx
@@ -7,6 +7,8 @@
   <p:sldIdLst>
     <p:sldId id="256" r:id="rId2"/>
     <p:sldId id="257" r:id="rId3"/>
+    <p:sldId id="258" r:id="rId4"/>
+    <p:sldId id="259" r:id="rId5"/>
   </p:sldIdLst>
   <p:sldSz cx="7315200" cy="7315200"/>
   <p:notesSz cx="6858000" cy="9144000"/>
@@ -244,7 +246,7 @@
           <a:p>
             <a:fld id="{2139EC92-9404-0A4C-9D2B-63AA64A6FFB1}" type="datetimeFigureOut">
               <a:rPr lang="en-US" smtClean="0"/>
-              <a:t>6/27/18</a:t>
+              <a:t>9/5/18</a:t>
             </a:fld>
             <a:endParaRPr lang="en-US"/>
           </a:p>
@@ -414,7 +416,7 @@
           <a:p>
             <a:fld id="{2139EC92-9404-0A4C-9D2B-63AA64A6FFB1}" type="datetimeFigureOut">
               <a:rPr lang="en-US" smtClean="0"/>
-              <a:t>6/27/18</a:t>
+              <a:t>9/5/18</a:t>
             </a:fld>
             <a:endParaRPr lang="en-US"/>
           </a:p>
@@ -594,7 +596,7 @@
           <a:p>
             <a:fld id="{2139EC92-9404-0A4C-9D2B-63AA64A6FFB1}" type="datetimeFigureOut">
               <a:rPr lang="en-US" smtClean="0"/>
-              <a:t>6/27/18</a:t>
+              <a:t>9/5/18</a:t>
             </a:fld>
             <a:endParaRPr lang="en-US"/>
           </a:p>
@@ -764,7 +766,7 @@
           <a:p>
             <a:fld id="{2139EC92-9404-0A4C-9D2B-63AA64A6FFB1}" type="datetimeFigureOut">
               <a:rPr lang="en-US" smtClean="0"/>
-              <a:t>6/27/18</a:t>
+              <a:t>9/5/18</a:t>
             </a:fld>
             <a:endParaRPr lang="en-US"/>
           </a:p>
@@ -1008,7 +1010,7 @@
           <a:p>
             <a:fld id="{2139EC92-9404-0A4C-9D2B-63AA64A6FFB1}" type="datetimeFigureOut">
               <a:rPr lang="en-US" smtClean="0"/>
-              <a:t>6/27/18</a:t>
+              <a:t>9/5/18</a:t>
             </a:fld>
             <a:endParaRPr lang="en-US"/>
           </a:p>
@@ -1240,7 +1242,7 @@
           <a:p>
             <a:fld id="{2139EC92-9404-0A4C-9D2B-63AA64A6FFB1}" type="datetimeFigureOut">
               <a:rPr lang="en-US" smtClean="0"/>
-              <a:t>6/27/18</a:t>
+              <a:t>9/5/18</a:t>
             </a:fld>
             <a:endParaRPr lang="en-US"/>
           </a:p>
@@ -1607,7 +1609,7 @@
           <a:p>
             <a:fld id="{2139EC92-9404-0A4C-9D2B-63AA64A6FFB1}" type="datetimeFigureOut">
               <a:rPr lang="en-US" smtClean="0"/>
-              <a:t>6/27/18</a:t>
+              <a:t>9/5/18</a:t>
             </a:fld>
             <a:endParaRPr lang="en-US"/>
           </a:p>
@@ -1725,7 +1727,7 @@
           <a:p>
             <a:fld id="{2139EC92-9404-0A4C-9D2B-63AA64A6FFB1}" type="datetimeFigureOut">
               <a:rPr lang="en-US" smtClean="0"/>
-              <a:t>6/27/18</a:t>
+              <a:t>9/5/18</a:t>
             </a:fld>
             <a:endParaRPr lang="en-US"/>
           </a:p>
@@ -1820,7 +1822,7 @@
           <a:p>
             <a:fld id="{2139EC92-9404-0A4C-9D2B-63AA64A6FFB1}" type="datetimeFigureOut">
               <a:rPr lang="en-US" smtClean="0"/>
-              <a:t>6/27/18</a:t>
+              <a:t>9/5/18</a:t>
             </a:fld>
             <a:endParaRPr lang="en-US"/>
           </a:p>
@@ -2097,7 +2099,7 @@
           <a:p>
             <a:fld id="{2139EC92-9404-0A4C-9D2B-63AA64A6FFB1}" type="datetimeFigureOut">
               <a:rPr lang="en-US" smtClean="0"/>
-              <a:t>6/27/18</a:t>
+              <a:t>9/5/18</a:t>
             </a:fld>
             <a:endParaRPr lang="en-US"/>
           </a:p>
@@ -2354,7 +2356,7 @@
           <a:p>
             <a:fld id="{2139EC92-9404-0A4C-9D2B-63AA64A6FFB1}" type="datetimeFigureOut">
               <a:rPr lang="en-US" smtClean="0"/>
-              <a:t>6/27/18</a:t>
+              <a:t>9/5/18</a:t>
             </a:fld>
             <a:endParaRPr lang="en-US"/>
           </a:p>
@@ -2567,7 +2569,7 @@
           <a:p>
             <a:fld id="{2139EC92-9404-0A4C-9D2B-63AA64A6FFB1}" type="datetimeFigureOut">
               <a:rPr lang="en-US" smtClean="0"/>
-              <a:t>6/27/18</a:t>
+              <a:t>9/5/18</a:t>
             </a:fld>
             <a:endParaRPr lang="en-US"/>
           </a:p>
@@ -2974,10 +2976,10 @@
       </p:grpSpPr>
       <p:grpSp>
         <p:nvGrpSpPr>
-          <p:cNvPr id="7" name="Group 6">
+          <p:cNvPr id="2" name="Group 1">
             <a:extLst>
               <a:ext uri="{FF2B5EF4-FFF2-40B4-BE49-F238E27FC236}">
-                <a16:creationId xmlns:a16="http://schemas.microsoft.com/office/drawing/2014/main" id="{F7124638-E7F1-224C-BE0B-600871774138}"/>
+                <a16:creationId xmlns:a16="http://schemas.microsoft.com/office/drawing/2014/main" id="{924870C4-63DF-A94A-AE5C-C00E08349E2C}"/>
               </a:ext>
             </a:extLst>
           </p:cNvPr>
@@ -2992,130 +2994,151 @@
             <a:chExt cx="8206740" cy="7315200"/>
           </a:xfrm>
         </p:grpSpPr>
-        <p:sp>
-          <p:nvSpPr>
-            <p:cNvPr id="4" name="Rectangle 3">
+        <p:grpSp>
+          <p:nvGrpSpPr>
+            <p:cNvPr id="7" name="Group 6">
               <a:extLst>
                 <a:ext uri="{FF2B5EF4-FFF2-40B4-BE49-F238E27FC236}">
-                  <a16:creationId xmlns:a16="http://schemas.microsoft.com/office/drawing/2014/main" id="{E332E649-81C7-564B-B57D-E68A2C9A6349}"/>
+                  <a16:creationId xmlns:a16="http://schemas.microsoft.com/office/drawing/2014/main" id="{F7124638-E7F1-224C-BE0B-600871774138}"/>
                 </a:ext>
               </a:extLst>
             </p:cNvPr>
-            <p:cNvSpPr/>
+            <p:cNvGrpSpPr/>
             <p:nvPr/>
-          </p:nvSpPr>
+          </p:nvGrpSpPr>
+          <p:grpSpPr>
+            <a:xfrm>
+              <a:off x="-445770" y="0"/>
+              <a:ext cx="8206740" cy="7315200"/>
+              <a:chOff x="-445770" y="0"/>
+              <a:chExt cx="8206740" cy="7315200"/>
+            </a:xfrm>
+          </p:grpSpPr>
+          <p:sp>
+            <p:nvSpPr>
+              <p:cNvPr id="4" name="Rectangle 3">
+                <a:extLst>
+                  <a:ext uri="{FF2B5EF4-FFF2-40B4-BE49-F238E27FC236}">
+                    <a16:creationId xmlns:a16="http://schemas.microsoft.com/office/drawing/2014/main" id="{E332E649-81C7-564B-B57D-E68A2C9A6349}"/>
+                  </a:ext>
+                </a:extLst>
+              </p:cNvPr>
+              <p:cNvSpPr/>
+              <p:nvPr/>
+            </p:nvSpPr>
+            <p:spPr>
+              <a:xfrm>
+                <a:off x="0" y="0"/>
+                <a:ext cx="7315200" cy="7315200"/>
+              </a:xfrm>
+              <a:prstGeom prst="rect">
+                <a:avLst/>
+              </a:prstGeom>
+              <a:solidFill>
+                <a:srgbClr val="1A202B"/>
+              </a:solidFill>
+              <a:ln>
+                <a:noFill/>
+              </a:ln>
+            </p:spPr>
+            <p:style>
+              <a:lnRef idx="2">
+                <a:schemeClr val="accent1">
+                  <a:shade val="50000"/>
+                </a:schemeClr>
+              </a:lnRef>
+              <a:fillRef idx="1">
+                <a:schemeClr val="accent1"/>
+              </a:fillRef>
+              <a:effectRef idx="0">
+                <a:schemeClr val="accent1"/>
+              </a:effectRef>
+              <a:fontRef idx="minor">
+                <a:schemeClr val="lt1"/>
+              </a:fontRef>
+            </p:style>
+            <p:txBody>
+              <a:bodyPr rtlCol="0" anchor="ctr"/>
+              <a:lstStyle/>
+              <a:p>
+                <a:pPr algn="ctr"/>
+                <a:endParaRPr lang="en-US" dirty="0"/>
+              </a:p>
+            </p:txBody>
+          </p:sp>
+          <p:sp>
+            <p:nvSpPr>
+              <p:cNvPr id="5" name="TextBox 4">
+                <a:extLst>
+                  <a:ext uri="{FF2B5EF4-FFF2-40B4-BE49-F238E27FC236}">
+                    <a16:creationId xmlns:a16="http://schemas.microsoft.com/office/drawing/2014/main" id="{ACDEAA07-D02E-9A4D-8628-E8521D28E43C}"/>
+                  </a:ext>
+                </a:extLst>
+              </p:cNvPr>
+              <p:cNvSpPr txBox="1"/>
+              <p:nvPr/>
+            </p:nvSpPr>
+            <p:spPr>
+              <a:xfrm>
+                <a:off x="-445770" y="727035"/>
+                <a:ext cx="8206740" cy="5324535"/>
+              </a:xfrm>
+              <a:prstGeom prst="rect">
+                <a:avLst/>
+              </a:prstGeom>
+              <a:noFill/>
+            </p:spPr>
+            <p:txBody>
+              <a:bodyPr wrap="square" rtlCol="0">
+                <a:spAutoFit/>
+              </a:bodyPr>
+              <a:lstStyle/>
+              <a:p>
+                <a:pPr algn="ctr"/>
+                <a:r>
+                  <a:rPr lang="en-US" sz="34000" dirty="0">
+                    <a:solidFill>
+                      <a:schemeClr val="bg1"/>
+                    </a:solidFill>
+                    <a:latin typeface="Consolas" panose="020B0609020204030204" pitchFamily="49" charset="0"/>
+                    <a:cs typeface="Consolas" panose="020B0609020204030204" pitchFamily="49" charset="0"/>
+                  </a:rPr>
+                  <a:t>&lt; &gt;</a:t>
+                </a:r>
+              </a:p>
+            </p:txBody>
+          </p:sp>
+        </p:grpSp>
+        <p:pic>
+          <p:nvPicPr>
+            <p:cNvPr id="9" name="Picture 8">
+              <a:extLst>
+                <a:ext uri="{FF2B5EF4-FFF2-40B4-BE49-F238E27FC236}">
+                  <a16:creationId xmlns:a16="http://schemas.microsoft.com/office/drawing/2014/main" id="{38573469-055B-A846-8DD0-924636F587AC}"/>
+                </a:ext>
+              </a:extLst>
+            </p:cNvPr>
+            <p:cNvPicPr>
+              <a:picLocks noChangeAspect="1"/>
+            </p:cNvPicPr>
+            <p:nvPr/>
+          </p:nvPicPr>
+          <p:blipFill rotWithShape="1">
+            <a:blip r:embed="rId2"/>
+            <a:srcRect l="33456" t="13705" r="33456" b="38586"/>
+            <a:stretch/>
+          </p:blipFill>
           <p:spPr>
             <a:xfrm>
-              <a:off x="0" y="0"/>
-              <a:ext cx="7315200" cy="7315200"/>
+              <a:off x="2447364" y="1990164"/>
+              <a:ext cx="2420471" cy="3334871"/>
             </a:xfrm>
             <a:prstGeom prst="rect">
               <a:avLst/>
             </a:prstGeom>
-            <a:solidFill>
-              <a:srgbClr val="1A202B"/>
-            </a:solidFill>
-            <a:ln>
-              <a:noFill/>
-            </a:ln>
           </p:spPr>
-          <p:style>
-            <a:lnRef idx="2">
-              <a:schemeClr val="accent1">
-                <a:shade val="50000"/>
-              </a:schemeClr>
-            </a:lnRef>
-            <a:fillRef idx="1">
-              <a:schemeClr val="accent1"/>
-            </a:fillRef>
-            <a:effectRef idx="0">
-              <a:schemeClr val="accent1"/>
-            </a:effectRef>
-            <a:fontRef idx="minor">
-              <a:schemeClr val="lt1"/>
-            </a:fontRef>
-          </p:style>
-          <p:txBody>
-            <a:bodyPr rtlCol="0" anchor="ctr"/>
-            <a:lstStyle/>
-            <a:p>
-              <a:pPr algn="ctr"/>
-              <a:endParaRPr lang="en-US" dirty="0"/>
-            </a:p>
-          </p:txBody>
-        </p:sp>
-        <p:sp>
-          <p:nvSpPr>
-            <p:cNvPr id="5" name="TextBox 4">
-              <a:extLst>
-                <a:ext uri="{FF2B5EF4-FFF2-40B4-BE49-F238E27FC236}">
-                  <a16:creationId xmlns:a16="http://schemas.microsoft.com/office/drawing/2014/main" id="{ACDEAA07-D02E-9A4D-8628-E8521D28E43C}"/>
-                </a:ext>
-              </a:extLst>
-            </p:cNvPr>
-            <p:cNvSpPr txBox="1"/>
-            <p:nvPr/>
-          </p:nvSpPr>
-          <p:spPr>
-            <a:xfrm>
-              <a:off x="-445770" y="727035"/>
-              <a:ext cx="8206740" cy="5324535"/>
-            </a:xfrm>
-            <a:prstGeom prst="rect">
-              <a:avLst/>
-            </a:prstGeom>
-            <a:noFill/>
-          </p:spPr>
-          <p:txBody>
-            <a:bodyPr wrap="square" rtlCol="0">
-              <a:spAutoFit/>
-            </a:bodyPr>
-            <a:lstStyle/>
-            <a:p>
-              <a:pPr algn="ctr"/>
-              <a:r>
-                <a:rPr lang="en-US" sz="34000" dirty="0">
-                  <a:solidFill>
-                    <a:schemeClr val="bg1"/>
-                  </a:solidFill>
-                  <a:latin typeface="Consolas" panose="020B0609020204030204" pitchFamily="49" charset="0"/>
-                  <a:cs typeface="Consolas" panose="020B0609020204030204" pitchFamily="49" charset="0"/>
-                </a:rPr>
-                <a:t>&lt; &gt;</a:t>
-              </a:r>
-            </a:p>
-          </p:txBody>
-        </p:sp>
+        </p:pic>
       </p:grpSp>
-      <p:pic>
-        <p:nvPicPr>
-          <p:cNvPr id="9" name="Picture 8">
-            <a:extLst>
-              <a:ext uri="{FF2B5EF4-FFF2-40B4-BE49-F238E27FC236}">
-                <a16:creationId xmlns:a16="http://schemas.microsoft.com/office/drawing/2014/main" id="{38573469-055B-A846-8DD0-924636F587AC}"/>
-              </a:ext>
-            </a:extLst>
-          </p:cNvPr>
-          <p:cNvPicPr>
-            <a:picLocks noChangeAspect="1"/>
-          </p:cNvPicPr>
-          <p:nvPr/>
-        </p:nvPicPr>
-        <p:blipFill rotWithShape="1">
-          <a:blip r:embed="rId2"/>
-          <a:srcRect l="33456" t="13705" r="33456" b="38586"/>
-          <a:stretch/>
-        </p:blipFill>
-        <p:spPr>
-          <a:xfrm>
-            <a:off x="2447364" y="1990164"/>
-            <a:ext cx="2420471" cy="3334871"/>
-          </a:xfrm>
-          <a:prstGeom prst="rect">
-            <a:avLst/>
-          </a:prstGeom>
-        </p:spPr>
-      </p:pic>
     </p:spTree>
     <p:extLst>
       <p:ext uri="{BB962C8B-B14F-4D97-AF65-F5344CB8AC3E}">
@@ -3148,10 +3171,10 @@
       </p:grpSpPr>
       <p:grpSp>
         <p:nvGrpSpPr>
-          <p:cNvPr id="7" name="Group 6">
+          <p:cNvPr id="2" name="Group 1">
             <a:extLst>
               <a:ext uri="{FF2B5EF4-FFF2-40B4-BE49-F238E27FC236}">
-                <a16:creationId xmlns:a16="http://schemas.microsoft.com/office/drawing/2014/main" id="{F7124638-E7F1-224C-BE0B-600871774138}"/>
+                <a16:creationId xmlns:a16="http://schemas.microsoft.com/office/drawing/2014/main" id="{5FEDC486-05ED-B446-9CC2-6EB8B56AEA2D}"/>
               </a:ext>
             </a:extLst>
           </p:cNvPr>
@@ -3166,148 +3189,573 @@
             <a:chExt cx="8206740" cy="7315200"/>
           </a:xfrm>
         </p:grpSpPr>
-        <p:sp>
-          <p:nvSpPr>
-            <p:cNvPr id="4" name="Rectangle 3">
+        <p:grpSp>
+          <p:nvGrpSpPr>
+            <p:cNvPr id="7" name="Group 6">
               <a:extLst>
                 <a:ext uri="{FF2B5EF4-FFF2-40B4-BE49-F238E27FC236}">
-                  <a16:creationId xmlns:a16="http://schemas.microsoft.com/office/drawing/2014/main" id="{E332E649-81C7-564B-B57D-E68A2C9A6349}"/>
+                  <a16:creationId xmlns:a16="http://schemas.microsoft.com/office/drawing/2014/main" id="{F7124638-E7F1-224C-BE0B-600871774138}"/>
                 </a:ext>
               </a:extLst>
             </p:cNvPr>
-            <p:cNvSpPr/>
+            <p:cNvGrpSpPr/>
             <p:nvPr/>
-          </p:nvSpPr>
+          </p:nvGrpSpPr>
+          <p:grpSpPr>
+            <a:xfrm>
+              <a:off x="-445770" y="0"/>
+              <a:ext cx="8206740" cy="7315200"/>
+              <a:chOff x="-445770" y="0"/>
+              <a:chExt cx="8206740" cy="7315200"/>
+            </a:xfrm>
+          </p:grpSpPr>
+          <p:sp>
+            <p:nvSpPr>
+              <p:cNvPr id="4" name="Rectangle 3">
+                <a:extLst>
+                  <a:ext uri="{FF2B5EF4-FFF2-40B4-BE49-F238E27FC236}">
+                    <a16:creationId xmlns:a16="http://schemas.microsoft.com/office/drawing/2014/main" id="{E332E649-81C7-564B-B57D-E68A2C9A6349}"/>
+                  </a:ext>
+                </a:extLst>
+              </p:cNvPr>
+              <p:cNvSpPr/>
+              <p:nvPr/>
+            </p:nvSpPr>
+            <p:spPr>
+              <a:xfrm>
+                <a:off x="0" y="0"/>
+                <a:ext cx="7315200" cy="7315200"/>
+              </a:xfrm>
+              <a:prstGeom prst="rect">
+                <a:avLst/>
+              </a:prstGeom>
+              <a:solidFill>
+                <a:srgbClr val="DADADA"/>
+              </a:solidFill>
+              <a:ln>
+                <a:noFill/>
+              </a:ln>
+            </p:spPr>
+            <p:style>
+              <a:lnRef idx="2">
+                <a:schemeClr val="accent1">
+                  <a:shade val="50000"/>
+                </a:schemeClr>
+              </a:lnRef>
+              <a:fillRef idx="1">
+                <a:schemeClr val="accent1"/>
+              </a:fillRef>
+              <a:effectRef idx="0">
+                <a:schemeClr val="accent1"/>
+              </a:effectRef>
+              <a:fontRef idx="minor">
+                <a:schemeClr val="lt1"/>
+              </a:fontRef>
+            </p:style>
+            <p:txBody>
+              <a:bodyPr rtlCol="0" anchor="ctr"/>
+              <a:lstStyle/>
+              <a:p>
+                <a:pPr algn="ctr"/>
+                <a:endParaRPr lang="en-US" dirty="0"/>
+              </a:p>
+            </p:txBody>
+          </p:sp>
+          <p:sp>
+            <p:nvSpPr>
+              <p:cNvPr id="5" name="TextBox 4">
+                <a:extLst>
+                  <a:ext uri="{FF2B5EF4-FFF2-40B4-BE49-F238E27FC236}">
+                    <a16:creationId xmlns:a16="http://schemas.microsoft.com/office/drawing/2014/main" id="{ACDEAA07-D02E-9A4D-8628-E8521D28E43C}"/>
+                  </a:ext>
+                </a:extLst>
+              </p:cNvPr>
+              <p:cNvSpPr txBox="1"/>
+              <p:nvPr/>
+            </p:nvSpPr>
+            <p:spPr>
+              <a:xfrm>
+                <a:off x="-445770" y="727035"/>
+                <a:ext cx="8206740" cy="5324535"/>
+              </a:xfrm>
+              <a:prstGeom prst="rect">
+                <a:avLst/>
+              </a:prstGeom>
+              <a:noFill/>
+            </p:spPr>
+            <p:txBody>
+              <a:bodyPr wrap="square" rtlCol="0">
+                <a:spAutoFit/>
+              </a:bodyPr>
+              <a:lstStyle/>
+              <a:p>
+                <a:pPr algn="ctr"/>
+                <a:r>
+                  <a:rPr lang="en-US" sz="34000" dirty="0">
+                    <a:solidFill>
+                      <a:srgbClr val="FCFCFC"/>
+                    </a:solidFill>
+                    <a:latin typeface="Consolas" panose="020B0609020204030204" pitchFamily="49" charset="0"/>
+                    <a:cs typeface="Consolas" panose="020B0609020204030204" pitchFamily="49" charset="0"/>
+                  </a:rPr>
+                  <a:t>&lt; &gt;</a:t>
+                </a:r>
+              </a:p>
+            </p:txBody>
+          </p:sp>
+        </p:grpSp>
+        <p:pic>
+          <p:nvPicPr>
+            <p:cNvPr id="9" name="Picture 8">
+              <a:extLst>
+                <a:ext uri="{FF2B5EF4-FFF2-40B4-BE49-F238E27FC236}">
+                  <a16:creationId xmlns:a16="http://schemas.microsoft.com/office/drawing/2014/main" id="{38573469-055B-A846-8DD0-924636F587AC}"/>
+                </a:ext>
+              </a:extLst>
+            </p:cNvPr>
+            <p:cNvPicPr>
+              <a:picLocks noChangeAspect="1"/>
+            </p:cNvPicPr>
+            <p:nvPr/>
+          </p:nvPicPr>
+          <p:blipFill rotWithShape="1">
+            <a:blip r:embed="rId2">
+              <a:alphaModFix amt="85000"/>
+              <a:lum bright="70000" contrast="-70000"/>
+              <a:extLst>
+                <a:ext uri="{BEBA8EAE-BF5A-486C-A8C5-ECC9F3942E4B}">
+                  <a14:imgProps xmlns:a14="http://schemas.microsoft.com/office/drawing/2010/main">
+                    <a14:imgLayer>
+                      <a14:imgEffect>
+                        <a14:saturation sat="0"/>
+                      </a14:imgEffect>
+                    </a14:imgLayer>
+                  </a14:imgProps>
+                </a:ext>
+              </a:extLst>
+            </a:blip>
+            <a:srcRect l="33456" t="13705" r="33456" b="38586"/>
+            <a:stretch/>
+          </p:blipFill>
           <p:spPr>
             <a:xfrm>
-              <a:off x="0" y="0"/>
-              <a:ext cx="7315200" cy="7315200"/>
+              <a:off x="2447364" y="1990164"/>
+              <a:ext cx="2420471" cy="3334871"/>
             </a:xfrm>
             <a:prstGeom prst="rect">
               <a:avLst/>
             </a:prstGeom>
-            <a:solidFill>
-              <a:srgbClr val="DADADA"/>
-            </a:solidFill>
-            <a:ln>
-              <a:noFill/>
-            </a:ln>
           </p:spPr>
-          <p:style>
-            <a:lnRef idx="2">
-              <a:schemeClr val="accent1">
-                <a:shade val="50000"/>
-              </a:schemeClr>
-            </a:lnRef>
-            <a:fillRef idx="1">
-              <a:schemeClr val="accent1"/>
-            </a:fillRef>
-            <a:effectRef idx="0">
-              <a:schemeClr val="accent1"/>
-            </a:effectRef>
-            <a:fontRef idx="minor">
-              <a:schemeClr val="lt1"/>
-            </a:fontRef>
-          </p:style>
-          <p:txBody>
-            <a:bodyPr rtlCol="0" anchor="ctr"/>
-            <a:lstStyle/>
-            <a:p>
-              <a:pPr algn="ctr"/>
-              <a:endParaRPr lang="en-US" dirty="0"/>
-            </a:p>
-          </p:txBody>
-        </p:sp>
-        <p:sp>
-          <p:nvSpPr>
-            <p:cNvPr id="5" name="TextBox 4">
+        </p:pic>
+      </p:grpSp>
+    </p:spTree>
+    <p:extLst>
+      <p:ext uri="{BB962C8B-B14F-4D97-AF65-F5344CB8AC3E}">
+        <p14:creationId xmlns:p14="http://schemas.microsoft.com/office/powerpoint/2010/main" val="993196870"/>
+      </p:ext>
+    </p:extLst>
+  </p:cSld>
+  <p:clrMapOvr>
+    <a:masterClrMapping/>
+  </p:clrMapOvr>
+</p:sld>
+</file>
+
+<file path=ppt/slides/slide3.xml><?xml version="1.0" encoding="utf-8"?>
+<p:sld xmlns:a="http://schemas.openxmlformats.org/drawingml/2006/main" xmlns:r="http://schemas.openxmlformats.org/officeDocument/2006/relationships" xmlns:p="http://schemas.openxmlformats.org/presentationml/2006/main">
+  <p:cSld>
+    <p:spTree>
+      <p:nvGrpSpPr>
+        <p:cNvPr id="1" name=""/>
+        <p:cNvGrpSpPr/>
+        <p:nvPr/>
+      </p:nvGrpSpPr>
+      <p:grpSpPr>
+        <a:xfrm>
+          <a:off x="0" y="0"/>
+          <a:ext cx="0" cy="0"/>
+          <a:chOff x="0" y="0"/>
+          <a:chExt cx="0" cy="0"/>
+        </a:xfrm>
+      </p:grpSpPr>
+      <p:grpSp>
+        <p:nvGrpSpPr>
+          <p:cNvPr id="2" name="Group 1">
+            <a:extLst>
+              <a:ext uri="{FF2B5EF4-FFF2-40B4-BE49-F238E27FC236}">
+                <a16:creationId xmlns:a16="http://schemas.microsoft.com/office/drawing/2014/main" id="{2ED83C92-326C-0542-85C4-6551F4083BAD}"/>
+              </a:ext>
+            </a:extLst>
+          </p:cNvPr>
+          <p:cNvGrpSpPr/>
+          <p:nvPr/>
+        </p:nvGrpSpPr>
+        <p:grpSpPr>
+          <a:xfrm>
+            <a:off x="-445770" y="0"/>
+            <a:ext cx="8206740" cy="7315200"/>
+            <a:chOff x="-445770" y="0"/>
+            <a:chExt cx="8206740" cy="7315200"/>
+          </a:xfrm>
+        </p:grpSpPr>
+        <p:grpSp>
+          <p:nvGrpSpPr>
+            <p:cNvPr id="7" name="Group 6">
               <a:extLst>
                 <a:ext uri="{FF2B5EF4-FFF2-40B4-BE49-F238E27FC236}">
-                  <a16:creationId xmlns:a16="http://schemas.microsoft.com/office/drawing/2014/main" id="{ACDEAA07-D02E-9A4D-8628-E8521D28E43C}"/>
+                  <a16:creationId xmlns:a16="http://schemas.microsoft.com/office/drawing/2014/main" id="{F7124638-E7F1-224C-BE0B-600871774138}"/>
                 </a:ext>
               </a:extLst>
             </p:cNvPr>
-            <p:cNvSpPr txBox="1"/>
+            <p:cNvGrpSpPr/>
             <p:nvPr/>
-          </p:nvSpPr>
+          </p:nvGrpSpPr>
+          <p:grpSpPr>
+            <a:xfrm>
+              <a:off x="-445770" y="0"/>
+              <a:ext cx="8206740" cy="7315200"/>
+              <a:chOff x="-445770" y="0"/>
+              <a:chExt cx="8206740" cy="7315200"/>
+            </a:xfrm>
+          </p:grpSpPr>
+          <p:sp>
+            <p:nvSpPr>
+              <p:cNvPr id="4" name="Rounded Rectangle 3">
+                <a:extLst>
+                  <a:ext uri="{FF2B5EF4-FFF2-40B4-BE49-F238E27FC236}">
+                    <a16:creationId xmlns:a16="http://schemas.microsoft.com/office/drawing/2014/main" id="{E332E649-81C7-564B-B57D-E68A2C9A6349}"/>
+                  </a:ext>
+                </a:extLst>
+              </p:cNvPr>
+              <p:cNvSpPr/>
+              <p:nvPr/>
+            </p:nvSpPr>
+            <p:spPr>
+              <a:xfrm>
+                <a:off x="0" y="0"/>
+                <a:ext cx="7315200" cy="7315200"/>
+              </a:xfrm>
+              <a:prstGeom prst="roundRect">
+                <a:avLst/>
+              </a:prstGeom>
+              <a:solidFill>
+                <a:srgbClr val="1A202B"/>
+              </a:solidFill>
+              <a:ln>
+                <a:noFill/>
+              </a:ln>
+            </p:spPr>
+            <p:style>
+              <a:lnRef idx="2">
+                <a:schemeClr val="accent1">
+                  <a:shade val="50000"/>
+                </a:schemeClr>
+              </a:lnRef>
+              <a:fillRef idx="1">
+                <a:schemeClr val="accent1"/>
+              </a:fillRef>
+              <a:effectRef idx="0">
+                <a:schemeClr val="accent1"/>
+              </a:effectRef>
+              <a:fontRef idx="minor">
+                <a:schemeClr val="lt1"/>
+              </a:fontRef>
+            </p:style>
+            <p:txBody>
+              <a:bodyPr rtlCol="0" anchor="ctr"/>
+              <a:lstStyle/>
+              <a:p>
+                <a:pPr algn="ctr"/>
+                <a:endParaRPr lang="en-US" dirty="0"/>
+              </a:p>
+            </p:txBody>
+          </p:sp>
+          <p:sp>
+            <p:nvSpPr>
+              <p:cNvPr id="5" name="TextBox 4">
+                <a:extLst>
+                  <a:ext uri="{FF2B5EF4-FFF2-40B4-BE49-F238E27FC236}">
+                    <a16:creationId xmlns:a16="http://schemas.microsoft.com/office/drawing/2014/main" id="{ACDEAA07-D02E-9A4D-8628-E8521D28E43C}"/>
+                  </a:ext>
+                </a:extLst>
+              </p:cNvPr>
+              <p:cNvSpPr txBox="1"/>
+              <p:nvPr/>
+            </p:nvSpPr>
+            <p:spPr>
+              <a:xfrm>
+                <a:off x="-445770" y="727035"/>
+                <a:ext cx="8206740" cy="5324535"/>
+              </a:xfrm>
+              <a:prstGeom prst="rect">
+                <a:avLst/>
+              </a:prstGeom>
+              <a:noFill/>
+            </p:spPr>
+            <p:txBody>
+              <a:bodyPr wrap="square" rtlCol="0">
+                <a:spAutoFit/>
+              </a:bodyPr>
+              <a:lstStyle/>
+              <a:p>
+                <a:pPr algn="ctr"/>
+                <a:r>
+                  <a:rPr lang="en-US" sz="34000" dirty="0">
+                    <a:solidFill>
+                      <a:schemeClr val="bg1"/>
+                    </a:solidFill>
+                    <a:latin typeface="Consolas" panose="020B0609020204030204" pitchFamily="49" charset="0"/>
+                    <a:cs typeface="Consolas" panose="020B0609020204030204" pitchFamily="49" charset="0"/>
+                  </a:rPr>
+                  <a:t>&lt; &gt;</a:t>
+                </a:r>
+              </a:p>
+            </p:txBody>
+          </p:sp>
+        </p:grpSp>
+        <p:pic>
+          <p:nvPicPr>
+            <p:cNvPr id="9" name="Picture 8">
+              <a:extLst>
+                <a:ext uri="{FF2B5EF4-FFF2-40B4-BE49-F238E27FC236}">
+                  <a16:creationId xmlns:a16="http://schemas.microsoft.com/office/drawing/2014/main" id="{38573469-055B-A846-8DD0-924636F587AC}"/>
+                </a:ext>
+              </a:extLst>
+            </p:cNvPr>
+            <p:cNvPicPr>
+              <a:picLocks noChangeAspect="1"/>
+            </p:cNvPicPr>
+            <p:nvPr/>
+          </p:nvPicPr>
+          <p:blipFill rotWithShape="1">
+            <a:blip r:embed="rId2"/>
+            <a:srcRect l="33456" t="13705" r="33456" b="38586"/>
+            <a:stretch/>
+          </p:blipFill>
           <p:spPr>
             <a:xfrm>
-              <a:off x="-445770" y="727035"/>
-              <a:ext cx="8206740" cy="5324535"/>
+              <a:off x="2447364" y="1990164"/>
+              <a:ext cx="2420471" cy="3334871"/>
             </a:xfrm>
             <a:prstGeom prst="rect">
               <a:avLst/>
             </a:prstGeom>
-            <a:noFill/>
           </p:spPr>
-          <p:txBody>
-            <a:bodyPr wrap="square" rtlCol="0">
-              <a:spAutoFit/>
-            </a:bodyPr>
-            <a:lstStyle/>
-            <a:p>
-              <a:pPr algn="ctr"/>
-              <a:r>
-                <a:rPr lang="en-US" sz="34000" dirty="0">
-                  <a:solidFill>
-                    <a:srgbClr val="FCFCFC"/>
-                  </a:solidFill>
-                  <a:latin typeface="Consolas" panose="020B0609020204030204" pitchFamily="49" charset="0"/>
-                  <a:cs typeface="Consolas" panose="020B0609020204030204" pitchFamily="49" charset="0"/>
-                </a:rPr>
-                <a:t>&lt; &gt;</a:t>
-              </a:r>
-            </a:p>
-          </p:txBody>
-        </p:sp>
+        </p:pic>
       </p:grpSp>
-      <p:pic>
-        <p:nvPicPr>
-          <p:cNvPr id="9" name="Picture 8">
+    </p:spTree>
+    <p:extLst>
+      <p:ext uri="{BB962C8B-B14F-4D97-AF65-F5344CB8AC3E}">
+        <p14:creationId xmlns:p14="http://schemas.microsoft.com/office/powerpoint/2010/main" val="2120473529"/>
+      </p:ext>
+    </p:extLst>
+  </p:cSld>
+  <p:clrMapOvr>
+    <a:masterClrMapping/>
+  </p:clrMapOvr>
+</p:sld>
+</file>
+
+<file path=ppt/slides/slide4.xml><?xml version="1.0" encoding="utf-8"?>
+<p:sld xmlns:a="http://schemas.openxmlformats.org/drawingml/2006/main" xmlns:r="http://schemas.openxmlformats.org/officeDocument/2006/relationships" xmlns:p="http://schemas.openxmlformats.org/presentationml/2006/main">
+  <p:cSld>
+    <p:spTree>
+      <p:nvGrpSpPr>
+        <p:cNvPr id="1" name=""/>
+        <p:cNvGrpSpPr/>
+        <p:nvPr/>
+      </p:nvGrpSpPr>
+      <p:grpSpPr>
+        <a:xfrm>
+          <a:off x="0" y="0"/>
+          <a:ext cx="0" cy="0"/>
+          <a:chOff x="0" y="0"/>
+          <a:chExt cx="0" cy="0"/>
+        </a:xfrm>
+      </p:grpSpPr>
+      <p:grpSp>
+        <p:nvGrpSpPr>
+          <p:cNvPr id="2" name="Group 1">
             <a:extLst>
               <a:ext uri="{FF2B5EF4-FFF2-40B4-BE49-F238E27FC236}">
-                <a16:creationId xmlns:a16="http://schemas.microsoft.com/office/drawing/2014/main" id="{38573469-055B-A846-8DD0-924636F587AC}"/>
+                <a16:creationId xmlns:a16="http://schemas.microsoft.com/office/drawing/2014/main" id="{FE3142EF-7A47-CC4F-93DD-4BA185BBB416}"/>
               </a:ext>
             </a:extLst>
           </p:cNvPr>
-          <p:cNvPicPr>
-            <a:picLocks noChangeAspect="1"/>
-          </p:cNvPicPr>
+          <p:cNvGrpSpPr/>
           <p:nvPr/>
-        </p:nvPicPr>
-        <p:blipFill rotWithShape="1">
-          <a:blip r:embed="rId2">
-            <a:alphaModFix amt="85000"/>
-            <a:lum bright="70000" contrast="-70000"/>
-            <a:extLst>
-              <a:ext uri="{BEBA8EAE-BF5A-486C-A8C5-ECC9F3942E4B}">
-                <a14:imgProps xmlns:a14="http://schemas.microsoft.com/office/drawing/2010/main">
-                  <a14:imgLayer>
-                    <a14:imgEffect>
-                      <a14:saturation sat="0"/>
-                    </a14:imgEffect>
-                  </a14:imgLayer>
-                </a14:imgProps>
-              </a:ext>
-            </a:extLst>
-          </a:blip>
-          <a:srcRect l="33456" t="13705" r="33456" b="38586"/>
-          <a:stretch/>
-        </p:blipFill>
-        <p:spPr>
+        </p:nvGrpSpPr>
+        <p:grpSpPr>
           <a:xfrm>
-            <a:off x="2447364" y="1990164"/>
-            <a:ext cx="2420471" cy="3334871"/>
+            <a:off x="-445770" y="0"/>
+            <a:ext cx="8206740" cy="7315200"/>
+            <a:chOff x="-445770" y="0"/>
+            <a:chExt cx="8206740" cy="7315200"/>
           </a:xfrm>
-          <a:prstGeom prst="rect">
-            <a:avLst/>
-          </a:prstGeom>
-        </p:spPr>
-      </p:pic>
+        </p:grpSpPr>
+        <p:grpSp>
+          <p:nvGrpSpPr>
+            <p:cNvPr id="7" name="Group 6">
+              <a:extLst>
+                <a:ext uri="{FF2B5EF4-FFF2-40B4-BE49-F238E27FC236}">
+                  <a16:creationId xmlns:a16="http://schemas.microsoft.com/office/drawing/2014/main" id="{F7124638-E7F1-224C-BE0B-600871774138}"/>
+                </a:ext>
+              </a:extLst>
+            </p:cNvPr>
+            <p:cNvGrpSpPr/>
+            <p:nvPr/>
+          </p:nvGrpSpPr>
+          <p:grpSpPr>
+            <a:xfrm>
+              <a:off x="-445770" y="0"/>
+              <a:ext cx="8206740" cy="7315200"/>
+              <a:chOff x="-445770" y="0"/>
+              <a:chExt cx="8206740" cy="7315200"/>
+            </a:xfrm>
+          </p:grpSpPr>
+          <p:sp>
+            <p:nvSpPr>
+              <p:cNvPr id="4" name="Rounded Rectangle 3">
+                <a:extLst>
+                  <a:ext uri="{FF2B5EF4-FFF2-40B4-BE49-F238E27FC236}">
+                    <a16:creationId xmlns:a16="http://schemas.microsoft.com/office/drawing/2014/main" id="{E332E649-81C7-564B-B57D-E68A2C9A6349}"/>
+                  </a:ext>
+                </a:extLst>
+              </p:cNvPr>
+              <p:cNvSpPr/>
+              <p:nvPr/>
+            </p:nvSpPr>
+            <p:spPr>
+              <a:xfrm>
+                <a:off x="0" y="0"/>
+                <a:ext cx="7315200" cy="7315200"/>
+              </a:xfrm>
+              <a:prstGeom prst="roundRect">
+                <a:avLst/>
+              </a:prstGeom>
+              <a:solidFill>
+                <a:srgbClr val="DADADA"/>
+              </a:solidFill>
+              <a:ln>
+                <a:noFill/>
+              </a:ln>
+            </p:spPr>
+            <p:style>
+              <a:lnRef idx="2">
+                <a:schemeClr val="accent1">
+                  <a:shade val="50000"/>
+                </a:schemeClr>
+              </a:lnRef>
+              <a:fillRef idx="1">
+                <a:schemeClr val="accent1"/>
+              </a:fillRef>
+              <a:effectRef idx="0">
+                <a:schemeClr val="accent1"/>
+              </a:effectRef>
+              <a:fontRef idx="minor">
+                <a:schemeClr val="lt1"/>
+              </a:fontRef>
+            </p:style>
+            <p:txBody>
+              <a:bodyPr rtlCol="0" anchor="ctr"/>
+              <a:lstStyle/>
+              <a:p>
+                <a:pPr algn="ctr"/>
+                <a:endParaRPr lang="en-US" dirty="0"/>
+              </a:p>
+            </p:txBody>
+          </p:sp>
+          <p:sp>
+            <p:nvSpPr>
+              <p:cNvPr id="5" name="TextBox 4">
+                <a:extLst>
+                  <a:ext uri="{FF2B5EF4-FFF2-40B4-BE49-F238E27FC236}">
+                    <a16:creationId xmlns:a16="http://schemas.microsoft.com/office/drawing/2014/main" id="{ACDEAA07-D02E-9A4D-8628-E8521D28E43C}"/>
+                  </a:ext>
+                </a:extLst>
+              </p:cNvPr>
+              <p:cNvSpPr txBox="1"/>
+              <p:nvPr/>
+            </p:nvSpPr>
+            <p:spPr>
+              <a:xfrm>
+                <a:off x="-445770" y="727035"/>
+                <a:ext cx="8206740" cy="5324535"/>
+              </a:xfrm>
+              <a:prstGeom prst="rect">
+                <a:avLst/>
+              </a:prstGeom>
+              <a:noFill/>
+            </p:spPr>
+            <p:txBody>
+              <a:bodyPr wrap="square" rtlCol="0">
+                <a:spAutoFit/>
+              </a:bodyPr>
+              <a:lstStyle/>
+              <a:p>
+                <a:pPr algn="ctr"/>
+                <a:r>
+                  <a:rPr lang="en-US" sz="34000" dirty="0">
+                    <a:solidFill>
+                      <a:srgbClr val="FCFCFC"/>
+                    </a:solidFill>
+                    <a:latin typeface="Consolas" panose="020B0609020204030204" pitchFamily="49" charset="0"/>
+                    <a:cs typeface="Consolas" panose="020B0609020204030204" pitchFamily="49" charset="0"/>
+                  </a:rPr>
+                  <a:t>&lt; &gt;</a:t>
+                </a:r>
+              </a:p>
+            </p:txBody>
+          </p:sp>
+        </p:grpSp>
+        <p:pic>
+          <p:nvPicPr>
+            <p:cNvPr id="9" name="Picture 8">
+              <a:extLst>
+                <a:ext uri="{FF2B5EF4-FFF2-40B4-BE49-F238E27FC236}">
+                  <a16:creationId xmlns:a16="http://schemas.microsoft.com/office/drawing/2014/main" id="{38573469-055B-A846-8DD0-924636F587AC}"/>
+                </a:ext>
+              </a:extLst>
+            </p:cNvPr>
+            <p:cNvPicPr>
+              <a:picLocks noChangeAspect="1"/>
+            </p:cNvPicPr>
+            <p:nvPr/>
+          </p:nvPicPr>
+          <p:blipFill rotWithShape="1">
+            <a:blip r:embed="rId2">
+              <a:alphaModFix amt="85000"/>
+              <a:lum bright="70000" contrast="-70000"/>
+              <a:extLst>
+                <a:ext uri="{BEBA8EAE-BF5A-486C-A8C5-ECC9F3942E4B}">
+                  <a14:imgProps xmlns:a14="http://schemas.microsoft.com/office/drawing/2010/main">
+                    <a14:imgLayer>
+                      <a14:imgEffect>
+                        <a14:saturation sat="0"/>
+                      </a14:imgEffect>
+                    </a14:imgLayer>
+                  </a14:imgProps>
+                </a:ext>
+              </a:extLst>
+            </a:blip>
+            <a:srcRect l="33456" t="13705" r="33456" b="38586"/>
+            <a:stretch/>
+          </p:blipFill>
+          <p:spPr>
+            <a:xfrm>
+              <a:off x="2447364" y="1990164"/>
+              <a:ext cx="2420471" cy="3334871"/>
+            </a:xfrm>
+            <a:prstGeom prst="rect">
+              <a:avLst/>
+            </a:prstGeom>
+          </p:spPr>
+        </p:pic>
+      </p:grpSp>
     </p:spTree>
     <p:extLst>
       <p:ext uri="{BB962C8B-B14F-4D97-AF65-F5344CB8AC3E}">
-        <p14:creationId xmlns:p14="http://schemas.microsoft.com/office/powerpoint/2010/main" val="993196870"/>
+        <p14:creationId xmlns:p14="http://schemas.microsoft.com/office/powerpoint/2010/main" val="1693133226"/>
       </p:ext>
     </p:extLst>
   </p:cSld>

</xml_diff>